<commit_message>
Change Model class diagram
</commit_message>
<xml_diff>
--- a/docs/diagrams/ModelComponentClassDiagram.pptx
+++ b/docs/diagrams/ModelComponentClassDiagram.pptx
@@ -126,6 +126,67 @@
 </p:presentation>
 </file>
 
+<file path=ppt/changesInfos/changesInfo1.xml><?xml version="1.0" encoding="utf-8"?>
+<pc:chgInfo xmlns:a="http://schemas.openxmlformats.org/drawingml/2006/main" xmlns:r="http://schemas.openxmlformats.org/officeDocument/2006/relationships" xmlns:ac="http://schemas.microsoft.com/office/drawing/2013/main/command" xmlns:pc="http://schemas.microsoft.com/office/powerpoint/2013/main/command">
+  <pc:docChgLst>
+    <pc:chgData name="Chan Jun Yuan" userId="30ea8f8e1118c6fe" providerId="LiveId" clId="{83C5CCA8-C707-472C-BE06-33FB9B093A89}"/>
+    <pc:docChg chg="undo modSld">
+      <pc:chgData name="Chan Jun Yuan" userId="30ea8f8e1118c6fe" providerId="LiveId" clId="{83C5CCA8-C707-472C-BE06-33FB9B093A89}" dt="2018-03-10T07:56:02.819" v="18" actId="14100"/>
+      <pc:docMkLst>
+        <pc:docMk/>
+      </pc:docMkLst>
+      <pc:sldChg chg="modSp">
+        <pc:chgData name="Chan Jun Yuan" userId="30ea8f8e1118c6fe" providerId="LiveId" clId="{83C5CCA8-C707-472C-BE06-33FB9B093A89}" dt="2018-03-10T07:56:02.819" v="18" actId="14100"/>
+        <pc:sldMkLst>
+          <pc:docMk/>
+          <pc:sldMk cId="2396968029" sldId="263"/>
+        </pc:sldMkLst>
+        <pc:spChg chg="mod">
+          <ac:chgData name="Chan Jun Yuan" userId="30ea8f8e1118c6fe" providerId="LiveId" clId="{83C5CCA8-C707-472C-BE06-33FB9B093A89}" dt="2018-03-10T07:56:02.819" v="18" actId="14100"/>
+          <ac:spMkLst>
+            <pc:docMk/>
+            <pc:sldMk cId="2396968029" sldId="263"/>
+            <ac:spMk id="49" creationId="{00000000-0000-0000-0000-000000000000}"/>
+          </ac:spMkLst>
+        </pc:spChg>
+        <pc:spChg chg="mod">
+          <ac:chgData name="Chan Jun Yuan" userId="30ea8f8e1118c6fe" providerId="LiveId" clId="{83C5CCA8-C707-472C-BE06-33FB9B093A89}" dt="2018-03-10T07:55:54.166" v="16" actId="1076"/>
+          <ac:spMkLst>
+            <pc:docMk/>
+            <pc:sldMk cId="2396968029" sldId="263"/>
+            <ac:spMk id="63" creationId="{00000000-0000-0000-0000-000000000000}"/>
+          </ac:spMkLst>
+        </pc:spChg>
+        <pc:spChg chg="mod">
+          <ac:chgData name="Chan Jun Yuan" userId="30ea8f8e1118c6fe" providerId="LiveId" clId="{83C5CCA8-C707-472C-BE06-33FB9B093A89}" dt="2018-03-10T07:55:55.635" v="17" actId="1076"/>
+          <ac:spMkLst>
+            <pc:docMk/>
+            <pc:sldMk cId="2396968029" sldId="263"/>
+            <ac:spMk id="118" creationId="{00000000-0000-0000-0000-000000000000}"/>
+          </ac:spMkLst>
+        </pc:spChg>
+        <pc:cxnChg chg="mod">
+          <ac:chgData name="Chan Jun Yuan" userId="30ea8f8e1118c6fe" providerId="LiveId" clId="{83C5CCA8-C707-472C-BE06-33FB9B093A89}" dt="2018-03-10T07:56:02.819" v="18" actId="14100"/>
+          <ac:cxnSpMkLst>
+            <pc:docMk/>
+            <pc:sldMk cId="2396968029" sldId="263"/>
+            <ac:cxnSpMk id="30" creationId="{00000000-0000-0000-0000-000000000000}"/>
+          </ac:cxnSpMkLst>
+        </pc:cxnChg>
+        <pc:cxnChg chg="mod">
+          <ac:chgData name="Chan Jun Yuan" userId="30ea8f8e1118c6fe" providerId="LiveId" clId="{83C5CCA8-C707-472C-BE06-33FB9B093A89}" dt="2018-03-10T07:55:54.166" v="16" actId="1076"/>
+          <ac:cxnSpMkLst>
+            <pc:docMk/>
+            <pc:sldMk cId="2396968029" sldId="263"/>
+            <ac:cxnSpMk id="64" creationId="{00000000-0000-0000-0000-000000000000}"/>
+          </ac:cxnSpMkLst>
+        </pc:cxnChg>
+      </pc:sldChg>
+    </pc:docChg>
+  </pc:docChgLst>
+</pc:chgInfo>
+</file>
+
 <file path=ppt/notesMasters/notesMaster1.xml><?xml version="1.0" encoding="utf-8"?>
 <p:notesMaster xmlns:a="http://schemas.openxmlformats.org/drawingml/2006/main" xmlns:r="http://schemas.openxmlformats.org/officeDocument/2006/relationships" xmlns:p="http://schemas.openxmlformats.org/presentationml/2006/main">
   <p:cSld>
@@ -208,7 +269,7 @@
           <a:p>
             <a:fld id="{F5CC4B3F-88C1-4FFA-B1B6-F41C21DC6924}" type="datetimeFigureOut">
               <a:rPr lang="en-US" smtClean="0"/>
-              <a:t>3/8/2018</a:t>
+              <a:t>3/10/2018</a:t>
             </a:fld>
             <a:endParaRPr lang="en-US" dirty="0"/>
           </a:p>
@@ -654,7 +715,7 @@
           <a:p>
             <a:fld id="{78C97017-6FC3-485B-9764-EAC9E56C1D49}" type="datetimeFigureOut">
               <a:rPr lang="en-US" smtClean="0"/>
-              <a:t>3/8/2018</a:t>
+              <a:t>3/10/2018</a:t>
             </a:fld>
             <a:endParaRPr lang="en-US" dirty="0"/>
           </a:p>
@@ -822,7 +883,7 @@
           <a:p>
             <a:fld id="{78C97017-6FC3-485B-9764-EAC9E56C1D49}" type="datetimeFigureOut">
               <a:rPr lang="en-US" smtClean="0"/>
-              <a:t>3/8/2018</a:t>
+              <a:t>3/10/2018</a:t>
             </a:fld>
             <a:endParaRPr lang="en-US" dirty="0"/>
           </a:p>
@@ -1000,7 +1061,7 @@
           <a:p>
             <a:fld id="{78C97017-6FC3-485B-9764-EAC9E56C1D49}" type="datetimeFigureOut">
               <a:rPr lang="en-US" smtClean="0"/>
-              <a:t>3/8/2018</a:t>
+              <a:t>3/10/2018</a:t>
             </a:fld>
             <a:endParaRPr lang="en-US" dirty="0"/>
           </a:p>
@@ -1168,7 +1229,7 @@
           <a:p>
             <a:fld id="{78C97017-6FC3-485B-9764-EAC9E56C1D49}" type="datetimeFigureOut">
               <a:rPr lang="en-US" smtClean="0"/>
-              <a:t>3/8/2018</a:t>
+              <a:t>3/10/2018</a:t>
             </a:fld>
             <a:endParaRPr lang="en-US" dirty="0"/>
           </a:p>
@@ -1413,7 +1474,7 @@
           <a:p>
             <a:fld id="{78C97017-6FC3-485B-9764-EAC9E56C1D49}" type="datetimeFigureOut">
               <a:rPr lang="en-US" smtClean="0"/>
-              <a:t>3/8/2018</a:t>
+              <a:t>3/10/2018</a:t>
             </a:fld>
             <a:endParaRPr lang="en-US" dirty="0"/>
           </a:p>
@@ -1698,7 +1759,7 @@
           <a:p>
             <a:fld id="{78C97017-6FC3-485B-9764-EAC9E56C1D49}" type="datetimeFigureOut">
               <a:rPr lang="en-US" smtClean="0"/>
-              <a:t>3/8/2018</a:t>
+              <a:t>3/10/2018</a:t>
             </a:fld>
             <a:endParaRPr lang="en-US" dirty="0"/>
           </a:p>
@@ -2117,7 +2178,7 @@
           <a:p>
             <a:fld id="{78C97017-6FC3-485B-9764-EAC9E56C1D49}" type="datetimeFigureOut">
               <a:rPr lang="en-US" smtClean="0"/>
-              <a:t>3/8/2018</a:t>
+              <a:t>3/10/2018</a:t>
             </a:fld>
             <a:endParaRPr lang="en-US" dirty="0"/>
           </a:p>
@@ -2234,7 +2295,7 @@
           <a:p>
             <a:fld id="{78C97017-6FC3-485B-9764-EAC9E56C1D49}" type="datetimeFigureOut">
               <a:rPr lang="en-US" smtClean="0"/>
-              <a:t>3/8/2018</a:t>
+              <a:t>3/10/2018</a:t>
             </a:fld>
             <a:endParaRPr lang="en-US" dirty="0"/>
           </a:p>
@@ -2329,7 +2390,7 @@
           <a:p>
             <a:fld id="{78C97017-6FC3-485B-9764-EAC9E56C1D49}" type="datetimeFigureOut">
               <a:rPr lang="en-US" smtClean="0"/>
-              <a:t>3/8/2018</a:t>
+              <a:t>3/10/2018</a:t>
             </a:fld>
             <a:endParaRPr lang="en-US" dirty="0"/>
           </a:p>
@@ -2604,7 +2665,7 @@
           <a:p>
             <a:fld id="{78C97017-6FC3-485B-9764-EAC9E56C1D49}" type="datetimeFigureOut">
               <a:rPr lang="en-US" smtClean="0"/>
-              <a:t>3/8/2018</a:t>
+              <a:t>3/10/2018</a:t>
             </a:fld>
             <a:endParaRPr lang="en-US" dirty="0"/>
           </a:p>
@@ -2856,7 +2917,7 @@
           <a:p>
             <a:fld id="{78C97017-6FC3-485B-9764-EAC9E56C1D49}" type="datetimeFigureOut">
               <a:rPr lang="en-US" smtClean="0"/>
-              <a:t>3/8/2018</a:t>
+              <a:t>3/10/2018</a:t>
             </a:fld>
             <a:endParaRPr lang="en-US" dirty="0"/>
           </a:p>
@@ -3067,7 +3128,7 @@
           <a:p>
             <a:fld id="{78C97017-6FC3-485B-9764-EAC9E56C1D49}" type="datetimeFigureOut">
               <a:rPr lang="en-US" smtClean="0"/>
-              <a:t>3/8/2018</a:t>
+              <a:t>3/10/2018</a:t>
             </a:fld>
             <a:endParaRPr lang="en-US" dirty="0"/>
           </a:p>
@@ -4102,8 +4163,8 @@
         </p:nvSpPr>
         <p:spPr>
           <a:xfrm>
-            <a:off x="4487017" y="2847371"/>
-            <a:ext cx="1156969" cy="346760"/>
+            <a:off x="4487016" y="2847371"/>
+            <a:ext cx="1213837" cy="346760"/>
           </a:xfrm>
           <a:prstGeom prst="rect">
             <a:avLst/>
@@ -4140,7 +4201,7 @@
                   <a:srgbClr val="7030A0"/>
                 </a:solidFill>
               </a:rPr>
-              <a:t>UniquePersonList</a:t>
+              <a:t>UniqueCinemaList</a:t>
             </a:r>
             <a:endParaRPr lang="en-SG" sz="1050" dirty="0">
               <a:solidFill>
@@ -4201,6 +4262,7 @@
         <p:nvCxnSpPr>
           <p:cNvPr id="30" name="Elbow Connector 29"/>
           <p:cNvCxnSpPr>
+            <a:cxnSpLocks/>
             <a:stCxn id="51" idx="3"/>
             <a:endCxn id="49" idx="1"/>
           </p:cNvCxnSpPr>
@@ -4209,7 +4271,7 @@
         <p:spPr>
           <a:xfrm>
             <a:off x="4220351" y="2760681"/>
-            <a:ext cx="266666" cy="260070"/>
+            <a:ext cx="266665" cy="260070"/>
           </a:xfrm>
           <a:prstGeom prst="bentConnector3">
             <a:avLst/>
@@ -4401,7 +4463,7 @@
         </p:nvSpPr>
         <p:spPr>
           <a:xfrm>
-            <a:off x="5643227" y="2943979"/>
+            <a:off x="5707552" y="2943979"/>
             <a:ext cx="236048" cy="173380"/>
           </a:xfrm>
           <a:prstGeom prst="flowChartDecision">
@@ -4442,6 +4504,7 @@
         <p:nvCxnSpPr>
           <p:cNvPr id="64" name="Elbow Connector 63"/>
           <p:cNvCxnSpPr>
+            <a:cxnSpLocks/>
             <a:stCxn id="63" idx="3"/>
             <a:endCxn id="62" idx="1"/>
           </p:cNvCxnSpPr>
@@ -4449,8 +4512,8 @@
         </p:nvCxnSpPr>
         <p:spPr>
           <a:xfrm>
-            <a:off x="5879275" y="3030669"/>
-            <a:ext cx="434402" cy="777"/>
+            <a:off x="5943600" y="3030669"/>
+            <a:ext cx="370077" cy="777"/>
           </a:xfrm>
           <a:prstGeom prst="bentConnector3">
             <a:avLst/>

</xml_diff>

<commit_message>
Add minor feature to DG
</commit_message>
<xml_diff>
--- a/docs/diagrams/ModelComponentClassDiagram.pptx
+++ b/docs/diagrams/ModelComponentClassDiagram.pptx
@@ -208,7 +208,7 @@
           <a:p>
             <a:fld id="{F5CC4B3F-88C1-4FFA-B1B6-F41C21DC6924}" type="datetimeFigureOut">
               <a:rPr lang="en-US" smtClean="0"/>
-              <a:t>3/19/2018</a:t>
+              <a:t>4/12/2018</a:t>
             </a:fld>
             <a:endParaRPr lang="en-US" dirty="0"/>
           </a:p>
@@ -654,7 +654,7 @@
           <a:p>
             <a:fld id="{78C97017-6FC3-485B-9764-EAC9E56C1D49}" type="datetimeFigureOut">
               <a:rPr lang="en-US" smtClean="0"/>
-              <a:t>3/19/2018</a:t>
+              <a:t>4/12/2018</a:t>
             </a:fld>
             <a:endParaRPr lang="en-US" dirty="0"/>
           </a:p>
@@ -822,7 +822,7 @@
           <a:p>
             <a:fld id="{78C97017-6FC3-485B-9764-EAC9E56C1D49}" type="datetimeFigureOut">
               <a:rPr lang="en-US" smtClean="0"/>
-              <a:t>3/19/2018</a:t>
+              <a:t>4/12/2018</a:t>
             </a:fld>
             <a:endParaRPr lang="en-US" dirty="0"/>
           </a:p>
@@ -1000,7 +1000,7 @@
           <a:p>
             <a:fld id="{78C97017-6FC3-485B-9764-EAC9E56C1D49}" type="datetimeFigureOut">
               <a:rPr lang="en-US" smtClean="0"/>
-              <a:t>3/19/2018</a:t>
+              <a:t>4/12/2018</a:t>
             </a:fld>
             <a:endParaRPr lang="en-US" dirty="0"/>
           </a:p>
@@ -1168,7 +1168,7 @@
           <a:p>
             <a:fld id="{78C97017-6FC3-485B-9764-EAC9E56C1D49}" type="datetimeFigureOut">
               <a:rPr lang="en-US" smtClean="0"/>
-              <a:t>3/19/2018</a:t>
+              <a:t>4/12/2018</a:t>
             </a:fld>
             <a:endParaRPr lang="en-US" dirty="0"/>
           </a:p>
@@ -1413,7 +1413,7 @@
           <a:p>
             <a:fld id="{78C97017-6FC3-485B-9764-EAC9E56C1D49}" type="datetimeFigureOut">
               <a:rPr lang="en-US" smtClean="0"/>
-              <a:t>3/19/2018</a:t>
+              <a:t>4/12/2018</a:t>
             </a:fld>
             <a:endParaRPr lang="en-US" dirty="0"/>
           </a:p>
@@ -1698,7 +1698,7 @@
           <a:p>
             <a:fld id="{78C97017-6FC3-485B-9764-EAC9E56C1D49}" type="datetimeFigureOut">
               <a:rPr lang="en-US" smtClean="0"/>
-              <a:t>3/19/2018</a:t>
+              <a:t>4/12/2018</a:t>
             </a:fld>
             <a:endParaRPr lang="en-US" dirty="0"/>
           </a:p>
@@ -2117,7 +2117,7 @@
           <a:p>
             <a:fld id="{78C97017-6FC3-485B-9764-EAC9E56C1D49}" type="datetimeFigureOut">
               <a:rPr lang="en-US" smtClean="0"/>
-              <a:t>3/19/2018</a:t>
+              <a:t>4/12/2018</a:t>
             </a:fld>
             <a:endParaRPr lang="en-US" dirty="0"/>
           </a:p>
@@ -2234,7 +2234,7 @@
           <a:p>
             <a:fld id="{78C97017-6FC3-485B-9764-EAC9E56C1D49}" type="datetimeFigureOut">
               <a:rPr lang="en-US" smtClean="0"/>
-              <a:t>3/19/2018</a:t>
+              <a:t>4/12/2018</a:t>
             </a:fld>
             <a:endParaRPr lang="en-US" dirty="0"/>
           </a:p>
@@ -2329,7 +2329,7 @@
           <a:p>
             <a:fld id="{78C97017-6FC3-485B-9764-EAC9E56C1D49}" type="datetimeFigureOut">
               <a:rPr lang="en-US" smtClean="0"/>
-              <a:t>3/19/2018</a:t>
+              <a:t>4/12/2018</a:t>
             </a:fld>
             <a:endParaRPr lang="en-US" dirty="0"/>
           </a:p>
@@ -2604,7 +2604,7 @@
           <a:p>
             <a:fld id="{78C97017-6FC3-485B-9764-EAC9E56C1D49}" type="datetimeFigureOut">
               <a:rPr lang="en-US" smtClean="0"/>
-              <a:t>3/19/2018</a:t>
+              <a:t>4/12/2018</a:t>
             </a:fld>
             <a:endParaRPr lang="en-US" dirty="0"/>
           </a:p>
@@ -2856,7 +2856,7 @@
           <a:p>
             <a:fld id="{78C97017-6FC3-485B-9764-EAC9E56C1D49}" type="datetimeFigureOut">
               <a:rPr lang="en-US" smtClean="0"/>
-              <a:t>3/19/2018</a:t>
+              <a:t>4/12/2018</a:t>
             </a:fld>
             <a:endParaRPr lang="en-US" dirty="0"/>
           </a:p>
@@ -3067,7 +3067,7 @@
           <a:p>
             <a:fld id="{78C97017-6FC3-485B-9764-EAC9E56C1D49}" type="datetimeFigureOut">
               <a:rPr lang="en-US" smtClean="0"/>
-              <a:t>3/19/2018</a:t>
+              <a:t>4/12/2018</a:t>
             </a:fld>
             <a:endParaRPr lang="en-US" dirty="0"/>
           </a:p>
@@ -4284,7 +4284,7 @@
                   <a:srgbClr val="7030A0"/>
                 </a:solidFill>
               </a:rPr>
-              <a:t>UniqueCategoryList</a:t>
+              <a:t>UniqueTagList</a:t>
             </a:r>
             <a:endParaRPr lang="en-SG" sz="1000" dirty="0">
               <a:solidFill>
@@ -4526,7 +4526,7 @@
                   <a:srgbClr val="7030A0"/>
                 </a:solidFill>
               </a:rPr>
-              <a:t>Category</a:t>
+              <a:t>Tag</a:t>
             </a:r>
             <a:endParaRPr lang="en-SG" sz="1050" dirty="0">
               <a:solidFill>

</xml_diff>